<commit_message>
GRAND MENAGE DE LA RENTREE 2014
</commit_message>
<xml_diff>
--- a/Cours1.pptx
+++ b/Cours1.pptx
@@ -260,7 +260,7 @@
               <a:pPr>
                 <a:defRPr/>
               </a:pPr>
-              <a:t>03/11/2013</a:t>
+              <a:t>10/10/2014</a:t>
             </a:fld>
             <a:endParaRPr lang="fr-FR"/>
           </a:p>
@@ -459,7 +459,7 @@
               <a:pPr>
                 <a:defRPr/>
               </a:pPr>
-              <a:t>03/11/2013</a:t>
+              <a:t>10/10/2014</a:t>
             </a:fld>
             <a:endParaRPr lang="fr-FR"/>
           </a:p>
@@ -1520,7 +1520,7 @@
               <a:pPr>
                 <a:defRPr/>
               </a:pPr>
-              <a:t>03/11/2013</a:t>
+              <a:t>10/10/2014</a:t>
             </a:fld>
             <a:endParaRPr lang="fr-FR"/>
           </a:p>
@@ -4305,7 +4305,7 @@
           <a:graphicData uri="http://schemas.openxmlformats.org/presentationml/2006/ole">
             <mc:AlternateContent xmlns:mc="http://schemas.openxmlformats.org/markup-compatibility/2006">
               <mc:Choice xmlns:v="urn:schemas-microsoft-com:vml" Requires="v">
-                <p:oleObj spid="_x0000_s8262" name="Équation" r:id="rId3" imgW="3682800" imgH="990360" progId="Equation.3">
+                <p:oleObj spid="_x0000_s8266" name="Équation" r:id="rId3" imgW="3682800" imgH="990360" progId="Equation.3">
                   <p:embed/>
                 </p:oleObj>
               </mc:Choice>
@@ -4362,7 +4362,7 @@
           <a:graphicData uri="http://schemas.openxmlformats.org/presentationml/2006/ole">
             <mc:AlternateContent xmlns:mc="http://schemas.openxmlformats.org/markup-compatibility/2006">
               <mc:Choice xmlns:v="urn:schemas-microsoft-com:vml" Requires="v">
-                <p:oleObj spid="_x0000_s8263" name="Équation" r:id="rId5" imgW="647640" imgH="241200" progId="Equation.3">
+                <p:oleObj spid="_x0000_s8267" name="Équation" r:id="rId5" imgW="647640" imgH="241200" progId="Equation.3">
                   <p:embed/>
                 </p:oleObj>
               </mc:Choice>
@@ -4419,7 +4419,7 @@
           <a:graphicData uri="http://schemas.openxmlformats.org/presentationml/2006/ole">
             <mc:AlternateContent xmlns:mc="http://schemas.openxmlformats.org/markup-compatibility/2006">
               <mc:Choice xmlns:v="urn:schemas-microsoft-com:vml" Requires="v">
-                <p:oleObj spid="_x0000_s8264" name="Équation" r:id="rId7" imgW="1549080" imgH="380880" progId="Equation.3">
+                <p:oleObj spid="_x0000_s8268" name="Équation" r:id="rId7" imgW="1549080" imgH="380880" progId="Equation.3">
                   <p:embed/>
                 </p:oleObj>
               </mc:Choice>
@@ -4476,7 +4476,7 @@
           <a:graphicData uri="http://schemas.openxmlformats.org/presentationml/2006/ole">
             <mc:AlternateContent xmlns:mc="http://schemas.openxmlformats.org/markup-compatibility/2006">
               <mc:Choice xmlns:v="urn:schemas-microsoft-com:vml" Requires="v">
-                <p:oleObj spid="_x0000_s8265" name="Équation" r:id="rId9" imgW="1726920" imgH="380880" progId="Equation.3">
+                <p:oleObj spid="_x0000_s8269" name="Équation" r:id="rId9" imgW="1726920" imgH="380880" progId="Equation.3">
                   <p:embed/>
                 </p:oleObj>
               </mc:Choice>
@@ -8450,7 +8450,7 @@
             <a:graphicData uri="http://schemas.openxmlformats.org/presentationml/2006/ole">
               <mc:AlternateContent xmlns:mc="http://schemas.openxmlformats.org/markup-compatibility/2006">
                 <mc:Choice xmlns:v="urn:schemas-microsoft-com:vml" Requires="v">
-                  <p:oleObj spid="_x0000_s1055" name="Équation" r:id="rId3" imgW="3924000" imgH="888840" progId="Equation.3">
+                  <p:oleObj spid="_x0000_s1056" name="Équation" r:id="rId3" imgW="3924000" imgH="888840" progId="Equation.3">
                     <p:embed/>
                   </p:oleObj>
                 </mc:Choice>
@@ -9042,8 +9042,21 @@
             <a:pPr lvl="1"/>
             <a:r>
               <a:rPr lang="fr-FR" dirty="0" smtClean="0"/>
+              <a:t>CASMO : </a:t>
+            </a:r>
+            <a:r>
+              <a:rPr lang="fr-FR" dirty="0" err="1" smtClean="0"/>
+              <a:t>Studsvik</a:t>
+            </a:r>
+            <a:endParaRPr lang="fr-FR" dirty="0" smtClean="0"/>
+          </a:p>
+          <a:p>
+            <a:pPr lvl="1"/>
+            <a:r>
+              <a:rPr lang="fr-FR" dirty="0" smtClean="0"/>
               <a:t>…</a:t>
             </a:r>
+            <a:endParaRPr lang="fr-FR" dirty="0" smtClean="0"/>
           </a:p>
           <a:p>
             <a:r>
@@ -9599,7 +9612,7 @@
           <a:graphicData uri="http://schemas.openxmlformats.org/presentationml/2006/ole">
             <mc:AlternateContent xmlns:mc="http://schemas.openxmlformats.org/markup-compatibility/2006">
               <mc:Choice xmlns:v="urn:schemas-microsoft-com:vml" Requires="v">
-                <p:oleObj spid="_x0000_s2171" name="Équation" r:id="rId3" imgW="4051080" imgH="888840" progId="Equation.3">
+                <p:oleObj spid="_x0000_s2175" name="Équation" r:id="rId3" imgW="4051080" imgH="888840" progId="Equation.3">
                   <p:embed/>
                 </p:oleObj>
               </mc:Choice>
@@ -9700,7 +9713,7 @@
           <a:graphicData uri="http://schemas.openxmlformats.org/presentationml/2006/ole">
             <mc:AlternateContent xmlns:mc="http://schemas.openxmlformats.org/markup-compatibility/2006">
               <mc:Choice xmlns:v="urn:schemas-microsoft-com:vml" Requires="v">
-                <p:oleObj spid="_x0000_s2172" name="Équation" r:id="rId5" imgW="3073320" imgH="469800" progId="Equation.3">
+                <p:oleObj spid="_x0000_s2176" name="Équation" r:id="rId5" imgW="3073320" imgH="469800" progId="Equation.3">
                   <p:embed/>
                 </p:oleObj>
               </mc:Choice>
@@ -9783,7 +9796,7 @@
           <a:graphicData uri="http://schemas.openxmlformats.org/presentationml/2006/ole">
             <mc:AlternateContent xmlns:mc="http://schemas.openxmlformats.org/markup-compatibility/2006">
               <mc:Choice xmlns:v="urn:schemas-microsoft-com:vml" Requires="v">
-                <p:oleObj spid="_x0000_s2173" name="Équation" r:id="rId7" imgW="4000320" imgH="761760" progId="Equation.3">
+                <p:oleObj spid="_x0000_s2177" name="Équation" r:id="rId7" imgW="4000320" imgH="761760" progId="Equation.3">
                   <p:embed/>
                 </p:oleObj>
               </mc:Choice>
@@ -9849,7 +9862,7 @@
           <a:graphicData uri="http://schemas.openxmlformats.org/presentationml/2006/ole">
             <mc:AlternateContent xmlns:mc="http://schemas.openxmlformats.org/markup-compatibility/2006">
               <mc:Choice xmlns:v="urn:schemas-microsoft-com:vml" Requires="v">
-                <p:oleObj spid="_x0000_s2174" name="Équation" r:id="rId9" imgW="3809880" imgH="507960" progId="Equation.3">
+                <p:oleObj spid="_x0000_s2178" name="Équation" r:id="rId9" imgW="3809880" imgH="507960" progId="Equation.3">
                   <p:embed/>
                 </p:oleObj>
               </mc:Choice>
@@ -10190,7 +10203,7 @@
           <a:graphicData uri="http://schemas.openxmlformats.org/presentationml/2006/ole">
             <mc:AlternateContent xmlns:mc="http://schemas.openxmlformats.org/markup-compatibility/2006">
               <mc:Choice xmlns:v="urn:schemas-microsoft-com:vml" Requires="v">
-                <p:oleObj spid="_x0000_s5194" name="Équation" r:id="rId3" imgW="3466800" imgH="266400" progId="Equation.3">
+                <p:oleObj spid="_x0000_s5197" name="Équation" r:id="rId3" imgW="3466800" imgH="266400" progId="Equation.3">
                   <p:embed/>
                 </p:oleObj>
               </mc:Choice>
@@ -10273,7 +10286,7 @@
           <a:graphicData uri="http://schemas.openxmlformats.org/presentationml/2006/ole">
             <mc:AlternateContent xmlns:mc="http://schemas.openxmlformats.org/markup-compatibility/2006">
               <mc:Choice xmlns:v="urn:schemas-microsoft-com:vml" Requires="v">
-                <p:oleObj spid="_x0000_s5195" name="Équation" r:id="rId5" imgW="3213000" imgH="761760" progId="Equation.3">
+                <p:oleObj spid="_x0000_s5198" name="Équation" r:id="rId5" imgW="3213000" imgH="761760" progId="Equation.3">
                   <p:embed/>
                 </p:oleObj>
               </mc:Choice>
@@ -10351,7 +10364,7 @@
           <a:graphicData uri="http://schemas.openxmlformats.org/presentationml/2006/ole">
             <mc:AlternateContent xmlns:mc="http://schemas.openxmlformats.org/markup-compatibility/2006">
               <mc:Choice xmlns:v="urn:schemas-microsoft-com:vml" Requires="v">
-                <p:oleObj spid="_x0000_s5196" name="Équation" r:id="rId7" imgW="2806560" imgH="444240" progId="Equation.3">
+                <p:oleObj spid="_x0000_s5199" name="Équation" r:id="rId7" imgW="2806560" imgH="444240" progId="Equation.3">
                   <p:embed/>
                 </p:oleObj>
               </mc:Choice>

</xml_diff>